<commit_message>
qp intro as well
</commit_message>
<xml_diff>
--- a/Lectures/4-24-15.pptx
+++ b/Lectures/4-24-15.pptx
@@ -5,8 +5,9 @@
     <p:sldMasterId id="2147483648" r:id="rId1"/>
   </p:sldMasterIdLst>
   <p:sldIdLst>
-    <p:sldId id="258" r:id="rId2"/>
-    <p:sldId id="257" r:id="rId3"/>
+    <p:sldId id="260" r:id="rId2"/>
+    <p:sldId id="258" r:id="rId3"/>
+    <p:sldId id="257" r:id="rId4"/>
   </p:sldIdLst>
   <p:sldSz cx="12192000" cy="6858000"/>
   <p:notesSz cx="6858000" cy="9144000"/>
@@ -105,6 +106,11 @@
       </a:defRPr>
     </a:lvl9pPr>
   </p:defaultTextStyle>
+  <p:extLst>
+    <p:ext uri="{EFAFB233-063F-42B5-8137-9DF3F51BA10A}">
+      <p15:sldGuideLst xmlns:p15="http://schemas.microsoft.com/office/powerpoint/2012/main"/>
+    </p:ext>
+  </p:extLst>
 </p:presentation>
 </file>
 
@@ -2977,6 +2983,132 @@
         </p:nvSpPr>
         <p:spPr/>
         <p:txBody>
+          <a:bodyPr/>
+          <a:lstStyle/>
+          <a:p>
+            <a:r>
+              <a:rPr lang="en-US" dirty="0" smtClean="0"/>
+              <a:t>Resilience project – next week</a:t>
+            </a:r>
+            <a:endParaRPr lang="en-US" dirty="0"/>
+          </a:p>
+        </p:txBody>
+      </p:sp>
+      <p:sp>
+        <p:nvSpPr>
+          <p:cNvPr id="3" name="Content Placeholder 2"/>
+          <p:cNvSpPr>
+            <a:spLocks noGrp="1"/>
+          </p:cNvSpPr>
+          <p:nvPr>
+            <p:ph idx="1"/>
+          </p:nvPr>
+        </p:nvSpPr>
+        <p:spPr/>
+        <p:txBody>
+          <a:bodyPr/>
+          <a:lstStyle/>
+          <a:p>
+            <a:pPr marL="0" indent="0">
+              <a:buNone/>
+            </a:pPr>
+            <a:endParaRPr lang="en-US"/>
+          </a:p>
+          <a:p>
+            <a:r>
+              <a:rPr lang="en-US" dirty="0" smtClean="0"/>
+              <a:t>Monday/Wednesday lab – heat stress</a:t>
+            </a:r>
+          </a:p>
+          <a:p>
+            <a:pPr lvl="1"/>
+            <a:r>
+              <a:rPr lang="en-US" b="1" dirty="0"/>
+              <a:t>Fuzzy </a:t>
+            </a:r>
+            <a:r>
+              <a:rPr lang="en-US" b="1" dirty="0" smtClean="0"/>
+              <a:t>Chitons - metabolic rate (DO)</a:t>
+            </a:r>
+            <a:endParaRPr lang="en-US" dirty="0" smtClean="0"/>
+          </a:p>
+          <a:p>
+            <a:r>
+              <a:rPr lang="en-US" dirty="0" smtClean="0"/>
+              <a:t>Tuesday/Thursday lab -  - mechanical stress</a:t>
+            </a:r>
+          </a:p>
+          <a:p>
+            <a:pPr lvl="1"/>
+            <a:r>
+              <a:rPr lang="en-US" b="1" dirty="0"/>
+              <a:t>Patrick </a:t>
+            </a:r>
+            <a:r>
+              <a:rPr lang="en-US" b="1" dirty="0" err="1" smtClean="0"/>
+              <a:t>Ochraceous</a:t>
+            </a:r>
+            <a:r>
+              <a:rPr lang="en-US" b="1" dirty="0" smtClean="0"/>
+              <a:t> - </a:t>
+            </a:r>
+            <a:r>
+              <a:rPr lang="en-US" b="1" dirty="0"/>
+              <a:t>metabolic rate (DO</a:t>
+            </a:r>
+            <a:r>
+              <a:rPr lang="en-US" b="1" dirty="0" smtClean="0"/>
+              <a:t>)</a:t>
+            </a:r>
+            <a:endParaRPr lang="en-US" dirty="0"/>
+          </a:p>
+          <a:p>
+            <a:endParaRPr lang="en-US" dirty="0"/>
+          </a:p>
+        </p:txBody>
+      </p:sp>
+    </p:spTree>
+    <p:extLst>
+      <p:ext uri="{BB962C8B-B14F-4D97-AF65-F5344CB8AC3E}">
+        <p14:creationId xmlns:p14="http://schemas.microsoft.com/office/powerpoint/2010/main" val="3652400959"/>
+      </p:ext>
+    </p:extLst>
+  </p:cSld>
+  <p:clrMapOvr>
+    <a:masterClrMapping/>
+  </p:clrMapOvr>
+</p:sld>
+</file>
+
+<file path=ppt/slides/slide2.xml><?xml version="1.0" encoding="utf-8"?>
+<p:sld xmlns:a="http://schemas.openxmlformats.org/drawingml/2006/main" xmlns:r="http://schemas.openxmlformats.org/officeDocument/2006/relationships" xmlns:p="http://schemas.openxmlformats.org/presentationml/2006/main">
+  <p:cSld>
+    <p:spTree>
+      <p:nvGrpSpPr>
+        <p:cNvPr id="1" name=""/>
+        <p:cNvGrpSpPr/>
+        <p:nvPr/>
+      </p:nvGrpSpPr>
+      <p:grpSpPr>
+        <a:xfrm>
+          <a:off x="0" y="0"/>
+          <a:ext cx="0" cy="0"/>
+          <a:chOff x="0" y="0"/>
+          <a:chExt cx="0" cy="0"/>
+        </a:xfrm>
+      </p:grpSpPr>
+      <p:sp>
+        <p:nvSpPr>
+          <p:cNvPr id="2" name="Title 1"/>
+          <p:cNvSpPr>
+            <a:spLocks noGrp="1"/>
+          </p:cNvSpPr>
+          <p:nvPr>
+            <p:ph type="title"/>
+          </p:nvPr>
+        </p:nvSpPr>
+        <p:spPr/>
+        <p:txBody>
           <a:bodyPr>
             <a:normAutofit/>
           </a:bodyPr>
@@ -3024,7 +3156,7 @@
 </p:sld>
 </file>
 
-<file path=ppt/slides/slide2.xml><?xml version="1.0" encoding="utf-8"?>
+<file path=ppt/slides/slide3.xml><?xml version="1.0" encoding="utf-8"?>
 <p:sld xmlns:a="http://schemas.openxmlformats.org/drawingml/2006/main" xmlns:r="http://schemas.openxmlformats.org/officeDocument/2006/relationships" xmlns:p="http://schemas.openxmlformats.org/presentationml/2006/main">
   <p:cSld>
     <p:spTree>

</xml_diff>